<commit_message>
analysis pipeline updates for BL ms
</commit_message>
<xml_diff>
--- a/slides/discoveryslides_verenameeting.pptx
+++ b/slides/discoveryslides_verenameeting.pptx
@@ -5,7 +5,7 @@
     <p:sldMasterId id="2147483648" r:id="rId1"/>
   </p:sldMasterIdLst>
   <p:notesMasterIdLst>
-    <p:notesMasterId r:id="rId21"/>
+    <p:notesMasterId r:id="rId20"/>
   </p:notesMasterIdLst>
   <p:sldIdLst>
     <p:sldId id="256" r:id="rId2"/>
@@ -26,7 +26,6 @@
     <p:sldId id="265" r:id="rId17"/>
     <p:sldId id="283" r:id="rId18"/>
     <p:sldId id="266" r:id="rId19"/>
-    <p:sldId id="271" r:id="rId20"/>
   </p:sldIdLst>
   <p:sldSz cx="12192000" cy="6858000"/>
   <p:notesSz cx="6858000" cy="9144000"/>
@@ -215,7 +214,7 @@
           <a:p>
             <a:fld id="{CB5E80E7-DB91-4DDB-93EB-BA84C099AB8C}" type="datetimeFigureOut">
               <a:rPr lang="en-GB" smtClean="0"/>
-              <a:t>12/01/2021</a:t>
+              <a:t>10/08/2021</a:t>
             </a:fld>
             <a:endParaRPr lang="en-GB"/>
           </a:p>
@@ -1390,94 +1389,6 @@
 </p:notes>
 </file>
 
-<file path=ppt/notesSlides/notesSlide18.xml><?xml version="1.0" encoding="utf-8"?>
-<p:notes xmlns:a="http://schemas.openxmlformats.org/drawingml/2006/main" xmlns:r="http://schemas.openxmlformats.org/officeDocument/2006/relationships" xmlns:p="http://schemas.openxmlformats.org/presentationml/2006/main">
-  <p:cSld>
-    <p:spTree>
-      <p:nvGrpSpPr>
-        <p:cNvPr id="1" name=""/>
-        <p:cNvGrpSpPr/>
-        <p:nvPr/>
-      </p:nvGrpSpPr>
-      <p:grpSpPr>
-        <a:xfrm>
-          <a:off x="0" y="0"/>
-          <a:ext cx="0" cy="0"/>
-          <a:chOff x="0" y="0"/>
-          <a:chExt cx="0" cy="0"/>
-        </a:xfrm>
-      </p:grpSpPr>
-      <p:sp>
-        <p:nvSpPr>
-          <p:cNvPr id="2" name="Slide Image Placeholder 1"/>
-          <p:cNvSpPr>
-            <a:spLocks noGrp="1" noRot="1" noChangeAspect="1"/>
-          </p:cNvSpPr>
-          <p:nvPr>
-            <p:ph type="sldImg"/>
-          </p:nvPr>
-        </p:nvSpPr>
-        <p:spPr/>
-      </p:sp>
-      <p:sp>
-        <p:nvSpPr>
-          <p:cNvPr id="3" name="Notes Placeholder 2"/>
-          <p:cNvSpPr>
-            <a:spLocks noGrp="1"/>
-          </p:cNvSpPr>
-          <p:nvPr>
-            <p:ph type="body" idx="1"/>
-          </p:nvPr>
-        </p:nvSpPr>
-        <p:spPr/>
-        <p:txBody>
-          <a:bodyPr/>
-          <a:lstStyle/>
-          <a:p>
-            <a:r>
-              <a:rPr lang="en-US" dirty="0"/>
-              <a:t>As an interesting aside, the shape of the curve when we use CLOVER is rather different – another clear inflection point post-1990s and pretty much constant/accelerating discovery since then</a:t>
-            </a:r>
-            <a:endParaRPr lang="en-GB" dirty="0"/>
-          </a:p>
-        </p:txBody>
-      </p:sp>
-      <p:sp>
-        <p:nvSpPr>
-          <p:cNvPr id="4" name="Slide Number Placeholder 3"/>
-          <p:cNvSpPr>
-            <a:spLocks noGrp="1"/>
-          </p:cNvSpPr>
-          <p:nvPr>
-            <p:ph type="sldNum" sz="quarter" idx="5"/>
-          </p:nvPr>
-        </p:nvSpPr>
-        <p:spPr/>
-        <p:txBody>
-          <a:bodyPr/>
-          <a:lstStyle/>
-          <a:p>
-            <a:fld id="{36817860-5BA2-4D87-AC66-7A99E630FE3A}" type="slidenum">
-              <a:rPr lang="en-GB" smtClean="0"/>
-              <a:t>19</a:t>
-            </a:fld>
-            <a:endParaRPr lang="en-GB"/>
-          </a:p>
-        </p:txBody>
-      </p:sp>
-    </p:spTree>
-    <p:extLst>
-      <p:ext uri="{BB962C8B-B14F-4D97-AF65-F5344CB8AC3E}">
-        <p14:creationId xmlns:p14="http://schemas.microsoft.com/office/powerpoint/2010/main" val="2326399118"/>
-      </p:ext>
-    </p:extLst>
-  </p:cSld>
-  <p:clrMapOvr>
-    <a:masterClrMapping/>
-  </p:clrMapOvr>
-</p:notes>
-</file>
-
 <file path=ppt/notesSlides/notesSlide2.xml><?xml version="1.0" encoding="utf-8"?>
 <p:notes xmlns:a="http://schemas.openxmlformats.org/drawingml/2006/main" xmlns:r="http://schemas.openxmlformats.org/officeDocument/2006/relationships" xmlns:p="http://schemas.openxmlformats.org/presentationml/2006/main">
   <p:cSld>
@@ -2405,7 +2316,7 @@
           <a:p>
             <a:fld id="{E703CA27-DE52-4F74-AB7B-7870FFE7D42D}" type="datetimeFigureOut">
               <a:rPr lang="en-GB" smtClean="0"/>
-              <a:t>12/01/2021</a:t>
+              <a:t>10/08/2021</a:t>
             </a:fld>
             <a:endParaRPr lang="en-GB"/>
           </a:p>
@@ -2605,7 +2516,7 @@
           <a:p>
             <a:fld id="{E703CA27-DE52-4F74-AB7B-7870FFE7D42D}" type="datetimeFigureOut">
               <a:rPr lang="en-GB" smtClean="0"/>
-              <a:t>12/01/2021</a:t>
+              <a:t>10/08/2021</a:t>
             </a:fld>
             <a:endParaRPr lang="en-GB"/>
           </a:p>
@@ -2815,7 +2726,7 @@
           <a:p>
             <a:fld id="{E703CA27-DE52-4F74-AB7B-7870FFE7D42D}" type="datetimeFigureOut">
               <a:rPr lang="en-GB" smtClean="0"/>
-              <a:t>12/01/2021</a:t>
+              <a:t>10/08/2021</a:t>
             </a:fld>
             <a:endParaRPr lang="en-GB"/>
           </a:p>
@@ -3015,7 +2926,7 @@
           <a:p>
             <a:fld id="{E703CA27-DE52-4F74-AB7B-7870FFE7D42D}" type="datetimeFigureOut">
               <a:rPr lang="en-GB" smtClean="0"/>
-              <a:t>12/01/2021</a:t>
+              <a:t>10/08/2021</a:t>
             </a:fld>
             <a:endParaRPr lang="en-GB"/>
           </a:p>
@@ -3291,7 +3202,7 @@
           <a:p>
             <a:fld id="{E703CA27-DE52-4F74-AB7B-7870FFE7D42D}" type="datetimeFigureOut">
               <a:rPr lang="en-GB" smtClean="0"/>
-              <a:t>12/01/2021</a:t>
+              <a:t>10/08/2021</a:t>
             </a:fld>
             <a:endParaRPr lang="en-GB"/>
           </a:p>
@@ -3559,7 +3470,7 @@
           <a:p>
             <a:fld id="{E703CA27-DE52-4F74-AB7B-7870FFE7D42D}" type="datetimeFigureOut">
               <a:rPr lang="en-GB" smtClean="0"/>
-              <a:t>12/01/2021</a:t>
+              <a:t>10/08/2021</a:t>
             </a:fld>
             <a:endParaRPr lang="en-GB"/>
           </a:p>
@@ -3974,7 +3885,7 @@
           <a:p>
             <a:fld id="{E703CA27-DE52-4F74-AB7B-7870FFE7D42D}" type="datetimeFigureOut">
               <a:rPr lang="en-GB" smtClean="0"/>
-              <a:t>12/01/2021</a:t>
+              <a:t>10/08/2021</a:t>
             </a:fld>
             <a:endParaRPr lang="en-GB"/>
           </a:p>
@@ -4116,7 +4027,7 @@
           <a:p>
             <a:fld id="{E703CA27-DE52-4F74-AB7B-7870FFE7D42D}" type="datetimeFigureOut">
               <a:rPr lang="en-GB" smtClean="0"/>
-              <a:t>12/01/2021</a:t>
+              <a:t>10/08/2021</a:t>
             </a:fld>
             <a:endParaRPr lang="en-GB"/>
           </a:p>
@@ -4229,7 +4140,7 @@
           <a:p>
             <a:fld id="{E703CA27-DE52-4F74-AB7B-7870FFE7D42D}" type="datetimeFigureOut">
               <a:rPr lang="en-GB" smtClean="0"/>
-              <a:t>12/01/2021</a:t>
+              <a:t>10/08/2021</a:t>
             </a:fld>
             <a:endParaRPr lang="en-GB"/>
           </a:p>
@@ -4542,7 +4453,7 @@
           <a:p>
             <a:fld id="{E703CA27-DE52-4F74-AB7B-7870FFE7D42D}" type="datetimeFigureOut">
               <a:rPr lang="en-GB" smtClean="0"/>
-              <a:t>12/01/2021</a:t>
+              <a:t>10/08/2021</a:t>
             </a:fld>
             <a:endParaRPr lang="en-GB"/>
           </a:p>
@@ -4831,7 +4742,7 @@
           <a:p>
             <a:fld id="{E703CA27-DE52-4F74-AB7B-7870FFE7D42D}" type="datetimeFigureOut">
               <a:rPr lang="en-GB" smtClean="0"/>
-              <a:t>12/01/2021</a:t>
+              <a:t>10/08/2021</a:t>
             </a:fld>
             <a:endParaRPr lang="en-GB"/>
           </a:p>
@@ -5074,7 +4985,7 @@
           <a:p>
             <a:fld id="{E703CA27-DE52-4F74-AB7B-7870FFE7D42D}" type="datetimeFigureOut">
               <a:rPr lang="en-GB" smtClean="0"/>
-              <a:t>12/01/2021</a:t>
+              <a:t>10/08/2021</a:t>
             </a:fld>
             <a:endParaRPr lang="en-GB"/>
           </a:p>
@@ -10498,485 +10409,6 @@
     <p:extLst>
       <p:ext uri="{BB962C8B-B14F-4D97-AF65-F5344CB8AC3E}">
         <p14:creationId xmlns:p14="http://schemas.microsoft.com/office/powerpoint/2010/main" val="862839816"/>
-      </p:ext>
-    </p:extLst>
-  </p:cSld>
-  <p:clrMapOvr>
-    <a:masterClrMapping/>
-  </p:clrMapOvr>
-</p:sld>
-</file>
-
-<file path=ppt/slides/slide19.xml><?xml version="1.0" encoding="utf-8"?>
-<p:sld xmlns:a="http://schemas.openxmlformats.org/drawingml/2006/main" xmlns:r="http://schemas.openxmlformats.org/officeDocument/2006/relationships" xmlns:p="http://schemas.openxmlformats.org/presentationml/2006/main">
-  <p:cSld>
-    <p:spTree>
-      <p:nvGrpSpPr>
-        <p:cNvPr id="1" name=""/>
-        <p:cNvGrpSpPr/>
-        <p:nvPr/>
-      </p:nvGrpSpPr>
-      <p:grpSpPr>
-        <a:xfrm>
-          <a:off x="0" y="0"/>
-          <a:ext cx="0" cy="0"/>
-          <a:chOff x="0" y="0"/>
-          <a:chExt cx="0" cy="0"/>
-        </a:xfrm>
-      </p:grpSpPr>
-      <p:grpSp>
-        <p:nvGrpSpPr>
-          <p:cNvPr id="6" name="Group 5">
-            <a:extLst>
-              <a:ext uri="{FF2B5EF4-FFF2-40B4-BE49-F238E27FC236}">
-                <a16:creationId xmlns:a16="http://schemas.microsoft.com/office/drawing/2014/main" id="{DCBB31E6-01B8-4ED6-9356-7DE41A4EBF25}"/>
-              </a:ext>
-            </a:extLst>
-          </p:cNvPr>
-          <p:cNvGrpSpPr/>
-          <p:nvPr/>
-        </p:nvGrpSpPr>
-        <p:grpSpPr>
-          <a:xfrm>
-            <a:off x="6506282" y="1648063"/>
-            <a:ext cx="4935177" cy="3708595"/>
-            <a:chOff x="464297" y="2968377"/>
-            <a:chExt cx="4935177" cy="3708595"/>
-          </a:xfrm>
-        </p:grpSpPr>
-        <p:pic>
-          <p:nvPicPr>
-            <p:cNvPr id="37" name="Picture 36" descr="Chart, line chart&#10;&#10;Description automatically generated">
-              <a:extLst>
-                <a:ext uri="{FF2B5EF4-FFF2-40B4-BE49-F238E27FC236}">
-                  <a16:creationId xmlns:a16="http://schemas.microsoft.com/office/drawing/2014/main" id="{CC120DB9-083F-4789-8CB2-96933DBA77B5}"/>
-                </a:ext>
-              </a:extLst>
-            </p:cNvPr>
-            <p:cNvPicPr>
-              <a:picLocks noChangeAspect="1"/>
-            </p:cNvPicPr>
-            <p:nvPr/>
-          </p:nvPicPr>
-          <p:blipFill>
-            <a:blip r:embed="rId3">
-              <a:extLst>
-                <a:ext uri="{28A0092B-C50C-407E-A947-70E740481C1C}">
-                  <a14:useLocalDpi xmlns:a14="http://schemas.microsoft.com/office/drawing/2010/main" val="0"/>
-                </a:ext>
-              </a:extLst>
-            </a:blip>
-            <a:stretch>
-              <a:fillRect/>
-            </a:stretch>
-          </p:blipFill>
-          <p:spPr>
-            <a:xfrm>
-              <a:off x="464297" y="3715865"/>
-              <a:ext cx="4935177" cy="2961107"/>
-            </a:xfrm>
-            <a:prstGeom prst="rect">
-              <a:avLst/>
-            </a:prstGeom>
-          </p:spPr>
-        </p:pic>
-        <p:sp>
-          <p:nvSpPr>
-            <p:cNvPr id="28" name="TextBox 27">
-              <a:extLst>
-                <a:ext uri="{FF2B5EF4-FFF2-40B4-BE49-F238E27FC236}">
-                  <a16:creationId xmlns:a16="http://schemas.microsoft.com/office/drawing/2014/main" id="{242D45AD-C1BA-4D2F-903E-51248320E20D}"/>
-                </a:ext>
-              </a:extLst>
-            </p:cNvPr>
-            <p:cNvSpPr txBox="1"/>
-            <p:nvPr/>
-          </p:nvSpPr>
-          <p:spPr>
-            <a:xfrm>
-              <a:off x="866772" y="2968377"/>
-              <a:ext cx="4532702" cy="707886"/>
-            </a:xfrm>
-            <a:prstGeom prst="rect">
-              <a:avLst/>
-            </a:prstGeom>
-            <a:noFill/>
-          </p:spPr>
-          <p:txBody>
-            <a:bodyPr wrap="square" rtlCol="0">
-              <a:spAutoFit/>
-            </a:bodyPr>
-            <a:lstStyle/>
-            <a:p>
-              <a:pPr algn="ctr"/>
-              <a:r>
-                <a:rPr lang="en-US" sz="2000" dirty="0">
-                  <a:solidFill>
-                    <a:schemeClr val="accent1">
-                      <a:lumMod val="75000"/>
-                    </a:schemeClr>
-                  </a:solidFill>
-                  <a:latin typeface="+mj-lt"/>
-                </a:rPr>
-                <a:t>Human virus discovery curve from </a:t>
-              </a:r>
-              <a:r>
-                <a:rPr lang="en-US" sz="2000" b="1" dirty="0">
-                  <a:solidFill>
-                    <a:schemeClr val="accent1">
-                      <a:lumMod val="75000"/>
-                    </a:schemeClr>
-                  </a:solidFill>
-                  <a:latin typeface="+mj-lt"/>
-                </a:rPr>
-                <a:t>CLOVER</a:t>
-              </a:r>
-              <a:br>
-                <a:rPr lang="en-US" sz="2000" dirty="0">
-                  <a:solidFill>
-                    <a:schemeClr val="accent1">
-                      <a:lumMod val="75000"/>
-                    </a:schemeClr>
-                  </a:solidFill>
-                  <a:latin typeface="+mj-lt"/>
-                </a:rPr>
-              </a:br>
-              <a:r>
-                <a:rPr lang="en-US" sz="2000" dirty="0">
-                  <a:solidFill>
-                    <a:schemeClr val="accent1">
-                      <a:lumMod val="75000"/>
-                    </a:schemeClr>
-                  </a:solidFill>
-                  <a:latin typeface="+mj-lt"/>
-                </a:rPr>
-                <a:t>(to 2010, PCR/sequencing/isolation)</a:t>
-              </a:r>
-            </a:p>
-          </p:txBody>
-        </p:sp>
-        <p:sp>
-          <p:nvSpPr>
-            <p:cNvPr id="30" name="Rectangle 29">
-              <a:extLst>
-                <a:ext uri="{FF2B5EF4-FFF2-40B4-BE49-F238E27FC236}">
-                  <a16:creationId xmlns:a16="http://schemas.microsoft.com/office/drawing/2014/main" id="{D14FE4DE-394A-448E-9297-4D39201BD3CC}"/>
-                </a:ext>
-              </a:extLst>
-            </p:cNvPr>
-            <p:cNvSpPr/>
-            <p:nvPr/>
-          </p:nvSpPr>
-          <p:spPr>
-            <a:xfrm>
-              <a:off x="2778105" y="3870325"/>
-              <a:ext cx="1875432" cy="615553"/>
-            </a:xfrm>
-            <a:prstGeom prst="rect">
-              <a:avLst/>
-            </a:prstGeom>
-          </p:spPr>
-          <p:txBody>
-            <a:bodyPr wrap="square">
-              <a:spAutoFit/>
-            </a:bodyPr>
-            <a:lstStyle/>
-            <a:p>
-              <a:r>
-                <a:rPr lang="en-US" sz="1700" dirty="0">
-                  <a:solidFill>
-                    <a:srgbClr val="C00000"/>
-                  </a:solidFill>
-                </a:rPr>
-                <a:t>5</a:t>
-              </a:r>
-              <a:r>
-                <a:rPr lang="en-GB" sz="1700" dirty="0">
-                  <a:solidFill>
-                    <a:srgbClr val="C00000"/>
-                  </a:solidFill>
-                </a:rPr>
-                <a:t>4 new viruses from 2005 to 2010</a:t>
-              </a:r>
-            </a:p>
-          </p:txBody>
-        </p:sp>
-        <p:pic>
-          <p:nvPicPr>
-            <p:cNvPr id="4" name="Picture 3">
-              <a:extLst>
-                <a:ext uri="{FF2B5EF4-FFF2-40B4-BE49-F238E27FC236}">
-                  <a16:creationId xmlns:a16="http://schemas.microsoft.com/office/drawing/2014/main" id="{4FDA85C1-BEE7-4E07-8E89-25F655000989}"/>
-                </a:ext>
-              </a:extLst>
-            </p:cNvPr>
-            <p:cNvPicPr>
-              <a:picLocks noChangeAspect="1"/>
-            </p:cNvPicPr>
-            <p:nvPr/>
-          </p:nvPicPr>
-          <p:blipFill>
-            <a:blip r:embed="rId4">
-              <a:extLst>
-                <a:ext uri="{28A0092B-C50C-407E-A947-70E740481C1C}">
-                  <a14:useLocalDpi xmlns:a14="http://schemas.microsoft.com/office/drawing/2010/main" val="0"/>
-                </a:ext>
-              </a:extLst>
-            </a:blip>
-            <a:stretch>
-              <a:fillRect/>
-            </a:stretch>
-          </p:blipFill>
-          <p:spPr>
-            <a:xfrm>
-              <a:off x="1112702" y="3774599"/>
-              <a:ext cx="919466" cy="919466"/>
-            </a:xfrm>
-            <a:prstGeom prst="rect">
-              <a:avLst/>
-            </a:prstGeom>
-          </p:spPr>
-        </p:pic>
-      </p:grpSp>
-      <p:sp>
-        <p:nvSpPr>
-          <p:cNvPr id="42" name="TextBox 41">
-            <a:extLst>
-              <a:ext uri="{FF2B5EF4-FFF2-40B4-BE49-F238E27FC236}">
-                <a16:creationId xmlns:a16="http://schemas.microsoft.com/office/drawing/2014/main" id="{2F3458DF-9150-497F-A4FF-C0BAEA653CDF}"/>
-              </a:ext>
-            </a:extLst>
-          </p:cNvPr>
-          <p:cNvSpPr txBox="1"/>
-          <p:nvPr/>
-        </p:nvSpPr>
-        <p:spPr>
-          <a:xfrm>
-            <a:off x="78090" y="211050"/>
-            <a:ext cx="12035820" cy="553998"/>
-          </a:xfrm>
-          <a:prstGeom prst="rect">
-            <a:avLst/>
-          </a:prstGeom>
-          <a:noFill/>
-        </p:spPr>
-        <p:txBody>
-          <a:bodyPr wrap="square" rtlCol="0">
-            <a:spAutoFit/>
-          </a:bodyPr>
-          <a:lstStyle/>
-          <a:p>
-            <a:pPr algn="ctr"/>
-            <a:r>
-              <a:rPr lang="en-US" sz="3000" dirty="0">
-                <a:solidFill>
-                  <a:schemeClr val="accent5">
-                    <a:lumMod val="50000"/>
-                  </a:schemeClr>
-                </a:solidFill>
-                <a:latin typeface="+mj-lt"/>
-              </a:rPr>
-              <a:t>Counting species using temporal discovery curves</a:t>
-            </a:r>
-            <a:endParaRPr lang="en-GB" sz="3000" dirty="0">
-              <a:solidFill>
-                <a:schemeClr val="accent5">
-                  <a:lumMod val="50000"/>
-                </a:schemeClr>
-              </a:solidFill>
-              <a:latin typeface="+mj-lt"/>
-            </a:endParaRPr>
-          </a:p>
-        </p:txBody>
-      </p:sp>
-      <p:grpSp>
-        <p:nvGrpSpPr>
-          <p:cNvPr id="48" name="Group 47">
-            <a:extLst>
-              <a:ext uri="{FF2B5EF4-FFF2-40B4-BE49-F238E27FC236}">
-                <a16:creationId xmlns:a16="http://schemas.microsoft.com/office/drawing/2014/main" id="{07ACF43D-7967-464A-941B-4C6C92095ED1}"/>
-              </a:ext>
-            </a:extLst>
-          </p:cNvPr>
-          <p:cNvGrpSpPr/>
-          <p:nvPr/>
-        </p:nvGrpSpPr>
-        <p:grpSpPr>
-          <a:xfrm>
-            <a:off x="219684" y="2104490"/>
-            <a:ext cx="5665231" cy="3419053"/>
-            <a:chOff x="6429085" y="807721"/>
-            <a:chExt cx="5665231" cy="3419053"/>
-          </a:xfrm>
-        </p:grpSpPr>
-        <p:pic>
-          <p:nvPicPr>
-            <p:cNvPr id="49" name="Picture 48" descr="Chart, line chart&#10;&#10;Description automatically generated">
-              <a:extLst>
-                <a:ext uri="{FF2B5EF4-FFF2-40B4-BE49-F238E27FC236}">
-                  <a16:creationId xmlns:a16="http://schemas.microsoft.com/office/drawing/2014/main" id="{10D53D1F-ECE5-4275-8DC1-245DC98A93F7}"/>
-                </a:ext>
-              </a:extLst>
-            </p:cNvPr>
-            <p:cNvPicPr>
-              <a:picLocks noChangeAspect="1"/>
-            </p:cNvPicPr>
-            <p:nvPr/>
-          </p:nvPicPr>
-          <p:blipFill rotWithShape="1">
-            <a:blip r:embed="rId5">
-              <a:extLst>
-                <a:ext uri="{28A0092B-C50C-407E-A947-70E740481C1C}">
-                  <a14:useLocalDpi xmlns:a14="http://schemas.microsoft.com/office/drawing/2010/main" val="0"/>
-                </a:ext>
-              </a:extLst>
-            </a:blip>
-            <a:srcRect b="33386"/>
-            <a:stretch/>
-          </p:blipFill>
-          <p:spPr>
-            <a:xfrm>
-              <a:off x="6429085" y="807721"/>
-              <a:ext cx="5665231" cy="3252168"/>
-            </a:xfrm>
-            <a:prstGeom prst="rect">
-              <a:avLst/>
-            </a:prstGeom>
-          </p:spPr>
-        </p:pic>
-        <p:sp>
-          <p:nvSpPr>
-            <p:cNvPr id="50" name="TextBox 49">
-              <a:extLst>
-                <a:ext uri="{FF2B5EF4-FFF2-40B4-BE49-F238E27FC236}">
-                  <a16:creationId xmlns:a16="http://schemas.microsoft.com/office/drawing/2014/main" id="{2C81C761-780F-4951-8155-2C1E676A68B5}"/>
-                </a:ext>
-              </a:extLst>
-            </p:cNvPr>
-            <p:cNvSpPr txBox="1"/>
-            <p:nvPr/>
-          </p:nvSpPr>
-          <p:spPr>
-            <a:xfrm>
-              <a:off x="10016799" y="3903609"/>
-              <a:ext cx="1982146" cy="323165"/>
-            </a:xfrm>
-            <a:prstGeom prst="rect">
-              <a:avLst/>
-            </a:prstGeom>
-            <a:noFill/>
-          </p:spPr>
-          <p:txBody>
-            <a:bodyPr wrap="none" rtlCol="0">
-              <a:spAutoFit/>
-            </a:bodyPr>
-            <a:lstStyle/>
-            <a:p>
-              <a:r>
-                <a:rPr lang="en-US" sz="1500" dirty="0" err="1"/>
-                <a:t>Woolhouse</a:t>
-              </a:r>
-              <a:r>
-                <a:rPr lang="en-US" sz="1500" dirty="0"/>
-                <a:t> </a:t>
-              </a:r>
-              <a:r>
-                <a:rPr lang="en-US" sz="1500" i="1" dirty="0"/>
-                <a:t>et al.</a:t>
-              </a:r>
-              <a:r>
-                <a:rPr lang="en-US" sz="1500" dirty="0"/>
-                <a:t>, 2008</a:t>
-              </a:r>
-              <a:endParaRPr lang="en-GB" sz="1500" dirty="0"/>
-            </a:p>
-          </p:txBody>
-        </p:sp>
-        <p:sp>
-          <p:nvSpPr>
-            <p:cNvPr id="51" name="TextBox 50">
-              <a:extLst>
-                <a:ext uri="{FF2B5EF4-FFF2-40B4-BE49-F238E27FC236}">
-                  <a16:creationId xmlns:a16="http://schemas.microsoft.com/office/drawing/2014/main" id="{7B3BFAFA-ACFB-412F-B8EE-9A21FEAF36D9}"/>
-                </a:ext>
-              </a:extLst>
-            </p:cNvPr>
-            <p:cNvSpPr txBox="1"/>
-            <p:nvPr/>
-          </p:nvSpPr>
-          <p:spPr>
-            <a:xfrm>
-              <a:off x="7620240" y="916302"/>
-              <a:ext cx="2879927" cy="707886"/>
-            </a:xfrm>
-            <a:prstGeom prst="rect">
-              <a:avLst/>
-            </a:prstGeom>
-            <a:noFill/>
-          </p:spPr>
-          <p:txBody>
-            <a:bodyPr wrap="square" rtlCol="0">
-              <a:spAutoFit/>
-            </a:bodyPr>
-            <a:lstStyle/>
-            <a:p>
-              <a:r>
-                <a:rPr lang="en-US" sz="2000" dirty="0">
-                  <a:solidFill>
-                    <a:schemeClr val="accent1">
-                      <a:lumMod val="75000"/>
-                    </a:schemeClr>
-                  </a:solidFill>
-                  <a:latin typeface="+mj-lt"/>
-                </a:rPr>
-                <a:t>Human virus discovery curve to 2005</a:t>
-              </a:r>
-            </a:p>
-          </p:txBody>
-        </p:sp>
-        <p:sp>
-          <p:nvSpPr>
-            <p:cNvPr id="52" name="Rectangle 51">
-              <a:extLst>
-                <a:ext uri="{FF2B5EF4-FFF2-40B4-BE49-F238E27FC236}">
-                  <a16:creationId xmlns:a16="http://schemas.microsoft.com/office/drawing/2014/main" id="{76C70B1C-6A02-4C49-A144-B63307C4F2FF}"/>
-                </a:ext>
-              </a:extLst>
-            </p:cNvPr>
-            <p:cNvSpPr/>
-            <p:nvPr/>
-          </p:nvSpPr>
-          <p:spPr>
-            <a:xfrm>
-              <a:off x="9760767" y="2604936"/>
-              <a:ext cx="2253272" cy="877163"/>
-            </a:xfrm>
-            <a:prstGeom prst="rect">
-              <a:avLst/>
-            </a:prstGeom>
-          </p:spPr>
-          <p:txBody>
-            <a:bodyPr wrap="square">
-              <a:spAutoFit/>
-            </a:bodyPr>
-            <a:lstStyle/>
-            <a:p>
-              <a:r>
-                <a:rPr lang="en-GB" sz="1700" i="1" dirty="0">
-                  <a:solidFill>
-                    <a:srgbClr val="C00000"/>
-                  </a:solidFill>
-                </a:rPr>
-                <a:t>“we [estimate] 10—40 new species to be discovered by 2020”</a:t>
-              </a:r>
-            </a:p>
-          </p:txBody>
-        </p:sp>
-      </p:grpSp>
-    </p:spTree>
-    <p:extLst>
-      <p:ext uri="{BB962C8B-B14F-4D97-AF65-F5344CB8AC3E}">
-        <p14:creationId xmlns:p14="http://schemas.microsoft.com/office/powerpoint/2010/main" val="1959346472"/>
       </p:ext>
     </p:extLst>
   </p:cSld>

</xml_diff>